<commit_message>
fixed issue of yasumi day
</commit_message>
<xml_diff>
--- a/10|2-6/2023-10-5/KANJI_ONLY_read.pptx
+++ b/10|2-6/2023-10-5/KANJI_ONLY_read.pptx
@@ -14,9 +14,10 @@
     <p:sldId id="262" r:id="rId8"/>
     <p:sldId id="263" r:id="rId9"/>
     <p:sldId id="264" r:id="rId10"/>
+    <p:sldId id="265" r:id="rId11"/>
   </p:sldIdLst>
   <p:notesMasterIdLst>
-    <p:notesMasterId r:id="rId11"/>
+    <p:notesMasterId r:id="rId12"/>
   </p:notesMasterIdLst>
   <p:sldSz cx="9144000" cy="5143500"/>
   <p:notesSz cx="5143500" cy="9144000"/>
@@ -534,6 +535,94 @@
             <a:fld id="{F7021451-1387-4CA6-816F-3879F97B5CBC}" type="slidenum">
               <a:rPr lang="en-US"/>
               <a:t>1</a:t>
+            </a:fld>
+            <a:endParaRPr lang="en-US"/>
+          </a:p>
+        </p:txBody>
+      </p:sp>
+    </p:spTree>
+    <p:extLst>
+      <p:ext uri="{BB962C8B-B14F-4D97-AF65-F5344CB8AC3E}">
+        <p14:creationId xmlns:p14="http://schemas.microsoft.com/office/powerpoint/2010/main" val="1024086991"/>
+      </p:ext>
+    </p:extLst>
+  </p:cSld>
+  <p:clrMapOvr>
+    <a:masterClrMapping/>
+  </p:clrMapOvr>
+</p:notes>
+</file>
+
+<file path=ppt/notesSlides/notesSlide10.xml><?xml version="1.0" encoding="utf-8"?>
+<p:notes xmlns:a="http://schemas.openxmlformats.org/drawingml/2006/main" xmlns:r="http://schemas.openxmlformats.org/officeDocument/2006/relationships" xmlns:p="http://schemas.openxmlformats.org/presentationml/2006/main">
+  <p:cSld>
+    <p:spTree>
+      <p:nvGrpSpPr>
+        <p:cNvPr id="1" name=""/>
+        <p:cNvGrpSpPr/>
+        <p:nvPr/>
+      </p:nvGrpSpPr>
+      <p:grpSpPr>
+        <a:xfrm>
+          <a:off x="0" y="0"/>
+          <a:ext cx="0" cy="0"/>
+          <a:chOff x="0" y="0"/>
+          <a:chExt cx="0" cy="0"/>
+        </a:xfrm>
+      </p:grpSpPr>
+      <p:sp>
+        <p:nvSpPr>
+          <p:cNvPr id="2" name="Slide Image Placeholder 1"/>
+          <p:cNvSpPr>
+            <a:spLocks noGrp="1" noRot="1" noChangeAspect="1"/>
+          </p:cNvSpPr>
+          <p:nvPr>
+            <p:ph type="sldImg"/>
+          </p:nvPr>
+        </p:nvSpPr>
+        <p:spPr/>
+      </p:sp>
+      <p:sp>
+        <p:nvSpPr>
+          <p:cNvPr id="3" name="Notes Placeholder 2"/>
+          <p:cNvSpPr>
+            <a:spLocks noGrp="1"/>
+          </p:cNvSpPr>
+          <p:nvPr>
+            <p:ph type="body" idx="1"/>
+          </p:nvPr>
+        </p:nvSpPr>
+        <p:spPr/>
+        <p:txBody>
+          <a:bodyPr/>
+          <a:lstStyle/>
+          <a:p>
+            <a:r>
+              <a:rPr lang="en-US" dirty="0"/>
+              <a:t/>
+            </a:r>
+            <a:endParaRPr lang="en-US" dirty="0"/>
+          </a:p>
+        </p:txBody>
+      </p:sp>
+      <p:sp>
+        <p:nvSpPr>
+          <p:cNvPr id="4" name="Slide Number Placeholder 3"/>
+          <p:cNvSpPr>
+            <a:spLocks noGrp="1"/>
+          </p:cNvSpPr>
+          <p:nvPr>
+            <p:ph type="sldNum" sz="quarter" idx="10"/>
+          </p:nvPr>
+        </p:nvSpPr>
+        <p:spPr/>
+        <p:txBody>
+          <a:bodyPr/>
+          <a:lstStyle/>
+          <a:p>
+            <a:fld id="{F7021451-1387-4CA6-816F-3879F97B5CBC}" type="slidenum">
+              <a:rPr lang="en-US"/>
+              <a:t>10</a:t>
             </a:fld>
             <a:endParaRPr lang="en-US"/>
           </a:p>
@@ -1610,7 +1699,7 @@
                   <a:srgbClr val="000000"/>
                 </a:solidFill>
               </a:rPr>
-              <a:t>殺す</a:t>
+              <a:t>幅広い</a:t>
             </a:r>
             <a:endParaRPr lang="en-US" sz="4800" dirty="0"/>
           </a:p>
@@ -1683,7 +1772,7 @@
                   <a:srgbClr val="808080"/>
                 </a:solidFill>
               </a:rPr>
-              <a:t>to kill, to slay, to murder, to slaughter | to suppress, to block, to hamper, to destroy (e.g. talent), to eliminate (e.g...</a:t>
+              <a:t>extensive, wide, broad...</a:t>
             </a:r>
             <a:endParaRPr lang="en-US" sz="3600" dirty="0"/>
           </a:p>
@@ -1719,7 +1808,177 @@
                   <a:srgbClr val="808080"/>
                 </a:solidFill>
               </a:rPr>
-              <a:t>67-68</a:t>
+              <a:t>65-66</a:t>
+            </a:r>
+            <a:endParaRPr lang="en-US" sz="2400" dirty="0"/>
+          </a:p>
+        </p:txBody>
+      </p:sp>
+    </p:spTree>
+  </p:cSld>
+  <p:clrMapOvr>
+    <a:masterClrMapping/>
+  </p:clrMapOvr>
+</p:sld>
+</file>
+
+<file path=ppt/slides/slide10.xml><?xml version="1.0" encoding="utf-8"?>
+<p:sld xmlns:a="http://schemas.openxmlformats.org/drawingml/2006/main" xmlns:r="http://schemas.openxmlformats.org/officeDocument/2006/relationships" xmlns:p="http://schemas.openxmlformats.org/presentationml/2006/main">
+  <p:cSld name="Slide 10">
+    <p:spTree>
+      <p:nvGrpSpPr>
+        <p:cNvPr id="1" name=""/>
+        <p:cNvGrpSpPr/>
+        <p:nvPr/>
+      </p:nvGrpSpPr>
+      <p:grpSpPr>
+        <a:xfrm>
+          <a:off x="0" y="0"/>
+          <a:ext cx="0" cy="0"/>
+          <a:chOff x="0" y="0"/>
+          <a:chExt cx="0" cy="0"/>
+        </a:xfrm>
+      </p:grpSpPr>
+      <p:sp>
+        <p:nvSpPr>
+          <p:cNvPr id="2" name="Text 0"/>
+          <p:cNvSpPr/>
+          <p:nvPr/>
+        </p:nvSpPr>
+        <p:spPr>
+          <a:xfrm>
+            <a:off x="0" y="548640"/>
+            <a:ext cx="9144000" cy="1828800"/>
+          </a:xfrm>
+          <a:prstGeom prst="rect">
+            <a:avLst/>
+          </a:prstGeom>
+          <a:noFill/>
+          <a:ln/>
+        </p:spPr>
+        <p:txBody>
+          <a:bodyPr wrap="square" rtlCol="0" anchor="ctr"/>
+          <a:lstStyle/>
+          <a:p>
+            <a:pPr algn="ctr" indent="0" marL="0">
+              <a:buNone/>
+            </a:pPr>
+            <a:r>
+              <a:rPr lang="en-US" sz="4800" dirty="0">
+                <a:solidFill>
+                  <a:srgbClr val="000000"/>
+                </a:solidFill>
+              </a:rPr>
+              <a:t>害虫</a:t>
+            </a:r>
+            <a:endParaRPr lang="en-US" sz="4800" dirty="0"/>
+          </a:p>
+        </p:txBody>
+      </p:sp>
+      <p:sp>
+        <p:nvSpPr>
+          <p:cNvPr id="3" name="Text 1"/>
+          <p:cNvSpPr/>
+          <p:nvPr/>
+        </p:nvSpPr>
+        <p:spPr>
+          <a:xfrm>
+            <a:off x="0" y="914400"/>
+            <a:ext cx="9144000" cy="1828800"/>
+          </a:xfrm>
+          <a:prstGeom prst="rect">
+            <a:avLst/>
+          </a:prstGeom>
+          <a:noFill/>
+          <a:ln/>
+        </p:spPr>
+        <p:txBody>
+          <a:bodyPr wrap="square" rtlCol="0" anchor="ctr"/>
+          <a:lstStyle/>
+          <a:p>
+            <a:pPr algn="ctr" indent="0" marL="0">
+              <a:buNone/>
+            </a:pPr>
+            <a:r>
+              <a:rPr lang="en-US" sz="3600" dirty="0">
+                <a:solidFill>
+                  <a:srgbClr val="404040"/>
+                </a:solidFill>
+              </a:rPr>
+              <a:t>
+</a:t>
+            </a:r>
+            <a:endParaRPr lang="en-US" sz="3600" dirty="0"/>
+          </a:p>
+        </p:txBody>
+      </p:sp>
+      <p:sp>
+        <p:nvSpPr>
+          <p:cNvPr id="4" name="Text 2"/>
+          <p:cNvSpPr/>
+          <p:nvPr/>
+        </p:nvSpPr>
+        <p:spPr>
+          <a:xfrm>
+            <a:off x="0" y="2743200"/>
+            <a:ext cx="9144000" cy="1828800"/>
+          </a:xfrm>
+          <a:prstGeom prst="rect">
+            <a:avLst/>
+          </a:prstGeom>
+          <a:noFill/>
+          <a:ln/>
+        </p:spPr>
+        <p:txBody>
+          <a:bodyPr wrap="square" rtlCol="0" anchor="ctr"/>
+          <a:lstStyle/>
+          <a:p>
+            <a:pPr algn="ctr" indent="0" marL="0">
+              <a:buNone/>
+            </a:pPr>
+            <a:r>
+              <a:rPr lang="en-US" sz="3600" dirty="0">
+                <a:solidFill>
+                  <a:srgbClr val="808080"/>
+                </a:solidFill>
+              </a:rPr>
+              <a:t>harmful insect, noxious insect, vermin, pest...</a:t>
+            </a:r>
+            <a:endParaRPr lang="en-US" sz="3600" dirty="0"/>
+          </a:p>
+        </p:txBody>
+      </p:sp>
+      <p:sp>
+        <p:nvSpPr>
+          <p:cNvPr id="5" name="Text 3"/>
+          <p:cNvSpPr/>
+          <p:nvPr/>
+        </p:nvSpPr>
+        <p:spPr>
+          <a:xfrm>
+            <a:off x="0" y="3657600"/>
+            <a:ext cx="8686800" cy="1828800"/>
+          </a:xfrm>
+          <a:prstGeom prst="rect">
+            <a:avLst/>
+          </a:prstGeom>
+          <a:noFill/>
+          <a:ln/>
+        </p:spPr>
+        <p:txBody>
+          <a:bodyPr wrap="square" rtlCol="0" anchor="ctr"/>
+          <a:lstStyle/>
+          <a:p>
+            <a:pPr algn="r" indent="0" marL="0">
+              <a:buNone/>
+            </a:pPr>
+            <a:r>
+              <a:rPr lang="en-US" sz="2400" dirty="0">
+                <a:solidFill>
+                  <a:srgbClr val="808080"/>
+                </a:solidFill>
+              </a:rPr>
+              <a:t>65-66</a:t>
             </a:r>
             <a:endParaRPr lang="en-US" sz="2400" dirty="0"/>
           </a:p>
@@ -1780,7 +2039,7 @@
                   <a:srgbClr val="000000"/>
                 </a:solidFill>
               </a:rPr>
-              <a:t>殺人</a:t>
+              <a:t>増幅</a:t>
             </a:r>
             <a:endParaRPr lang="en-US" sz="4800" dirty="0"/>
           </a:p>
@@ -1853,7 +2112,7 @@
                   <a:srgbClr val="808080"/>
                 </a:solidFill>
               </a:rPr>
-              <a:t>murder, homicide, manslaughter...</a:t>
+              <a:t>amplification (elec.) | magnification, amplification, making larger...</a:t>
             </a:r>
             <a:endParaRPr lang="en-US" sz="3600" dirty="0"/>
           </a:p>
@@ -1889,7 +2148,7 @@
                   <a:srgbClr val="808080"/>
                 </a:solidFill>
               </a:rPr>
-              <a:t>67-68</a:t>
+              <a:t>65-66</a:t>
             </a:r>
             <a:endParaRPr lang="en-US" sz="2400" dirty="0"/>
           </a:p>
@@ -1950,7 +2209,7 @@
                   <a:srgbClr val="000000"/>
                 </a:solidFill>
               </a:rPr>
-              <a:t>農薬</a:t>
+              <a:t>支える</a:t>
             </a:r>
             <a:endParaRPr lang="en-US" sz="4800" dirty="0"/>
           </a:p>
@@ -2023,7 +2282,7 @@
                   <a:srgbClr val="808080"/>
                 </a:solidFill>
               </a:rPr>
-              <a:t>agricultural chemical (i.e. pesticide, herbicide, fungicide, etc.), agrochemical, agrichemical...</a:t>
+              <a:t>to support, to prop, to sustain, to underlay, to hold up, to defend | to hold at bay, to stem, to check...</a:t>
             </a:r>
             <a:endParaRPr lang="en-US" sz="3600" dirty="0"/>
           </a:p>
@@ -2059,7 +2318,7 @@
                   <a:srgbClr val="808080"/>
                 </a:solidFill>
               </a:rPr>
-              <a:t>67-68</a:t>
+              <a:t>65-66</a:t>
             </a:r>
             <a:endParaRPr lang="en-US" sz="2400" dirty="0"/>
           </a:p>
@@ -2120,7 +2379,7 @@
                   <a:srgbClr val="000000"/>
                 </a:solidFill>
               </a:rPr>
-              <a:t>収入印紙</a:t>
+              <a:t>支持</a:t>
             </a:r>
             <a:endParaRPr lang="en-US" sz="4800" dirty="0"/>
           </a:p>
@@ -2193,7 +2452,7 @@
                   <a:srgbClr val="808080"/>
                 </a:solidFill>
               </a:rPr>
-              <a:t>revenue stamp...</a:t>
+              <a:t>support, backing, endorsement, approval | propping up, holding up, support...</a:t>
             </a:r>
             <a:endParaRPr lang="en-US" sz="3600" dirty="0"/>
           </a:p>
@@ -2229,7 +2488,7 @@
                   <a:srgbClr val="808080"/>
                 </a:solidFill>
               </a:rPr>
-              <a:t>67-68</a:t>
+              <a:t>65-66</a:t>
             </a:r>
             <a:endParaRPr lang="en-US" sz="2400" dirty="0"/>
           </a:p>
@@ -2290,7 +2549,7 @@
                   <a:srgbClr val="000000"/>
                 </a:solidFill>
               </a:rPr>
-              <a:t>収穫</a:t>
+              <a:t>反対</a:t>
             </a:r>
             <a:endParaRPr lang="en-US" sz="4800" dirty="0"/>
           </a:p>
@@ -2363,7 +2622,7 @@
                   <a:srgbClr val="808080"/>
                 </a:solidFill>
               </a:rPr>
-              <a:t>harvest, crop, ingathering | fruits (of one's labors), gain, result, returns...</a:t>
+              <a:t>opposition, resistance, antagonism, hostility, objection, dissent | reverse, opposite, inverse, contrary...</a:t>
             </a:r>
             <a:endParaRPr lang="en-US" sz="3600" dirty="0"/>
           </a:p>
@@ -2399,7 +2658,7 @@
                   <a:srgbClr val="808080"/>
                 </a:solidFill>
               </a:rPr>
-              <a:t>67-68</a:t>
+              <a:t>65-66</a:t>
             </a:r>
             <a:endParaRPr lang="en-US" sz="2400" dirty="0"/>
           </a:p>
@@ -2460,7 +2719,7 @@
                   <a:srgbClr val="000000"/>
                 </a:solidFill>
               </a:rPr>
-              <a:t>少量</a:t>
+              <a:t>論文</a:t>
             </a:r>
             <a:endParaRPr lang="en-US" sz="4800" dirty="0"/>
           </a:p>
@@ -2533,7 +2792,7 @@
                   <a:srgbClr val="808080"/>
                 </a:solidFill>
               </a:rPr>
-              <a:t>small quantity, small amount | narrowmindedness...</a:t>
+              <a:t>thesis, essay, treatise, paper, article...</a:t>
             </a:r>
             <a:endParaRPr lang="en-US" sz="3600" dirty="0"/>
           </a:p>
@@ -2569,7 +2828,7 @@
                   <a:srgbClr val="808080"/>
                 </a:solidFill>
               </a:rPr>
-              <a:t>67-68</a:t>
+              <a:t>65-66</a:t>
             </a:r>
             <a:endParaRPr lang="en-US" sz="2400" dirty="0"/>
           </a:p>
@@ -2630,7 +2889,7 @@
                   <a:srgbClr val="000000"/>
                 </a:solidFill>
               </a:rPr>
-              <a:t>完全</a:t>
+              <a:t>否定</a:t>
             </a:r>
             <a:endParaRPr lang="en-US" sz="4800" dirty="0"/>
           </a:p>
@@ -2703,7 +2962,7 @@
                   <a:srgbClr val="808080"/>
                 </a:solidFill>
               </a:rPr>
-              <a:t>perfect, complete...</a:t>
+              <a:t>denial, negation, repudiation, disavowal | negation | NOT operation...</a:t>
             </a:r>
             <a:endParaRPr lang="en-US" sz="3600" dirty="0"/>
           </a:p>
@@ -2739,7 +2998,7 @@
                   <a:srgbClr val="808080"/>
                 </a:solidFill>
               </a:rPr>
-              <a:t>67-68</a:t>
+              <a:t>65-66</a:t>
             </a:r>
             <a:endParaRPr lang="en-US" sz="2400" dirty="0"/>
           </a:p>
@@ -2800,7 +3059,7 @@
                   <a:srgbClr val="000000"/>
                 </a:solidFill>
               </a:rPr>
-              <a:t>原因</a:t>
+              <a:t>野菜</a:t>
             </a:r>
             <a:endParaRPr lang="en-US" sz="4800" dirty="0"/>
           </a:p>
@@ -2873,7 +3132,7 @@
                   <a:srgbClr val="808080"/>
                 </a:solidFill>
               </a:rPr>
-              <a:t>cause, origin, source...</a:t>
+              <a:t>vegetable...</a:t>
             </a:r>
             <a:endParaRPr lang="en-US" sz="3600" dirty="0"/>
           </a:p>
@@ -2909,7 +3168,7 @@
                   <a:srgbClr val="808080"/>
                 </a:solidFill>
               </a:rPr>
-              <a:t>67-68</a:t>
+              <a:t>65-66</a:t>
             </a:r>
             <a:endParaRPr lang="en-US" sz="2400" dirty="0"/>
           </a:p>
@@ -2970,7 +3229,7 @@
                   <a:srgbClr val="000000"/>
                 </a:solidFill>
               </a:rPr>
-              <a:t>一環</a:t>
+              <a:t>穀物</a:t>
             </a:r>
             <a:endParaRPr lang="en-US" sz="4800" dirty="0"/>
           </a:p>
@@ -3043,7 +3302,7 @@
                   <a:srgbClr val="808080"/>
                 </a:solidFill>
               </a:rPr>
-              <a:t>link (e.g. in a chain of events), part (of a plan, campaign, activities, etc.) | monocyclic...</a:t>
+              <a:t>grain, cereal, corn...</a:t>
             </a:r>
             <a:endParaRPr lang="en-US" sz="3600" dirty="0"/>
           </a:p>
@@ -3079,7 +3338,7 @@
                   <a:srgbClr val="808080"/>
                 </a:solidFill>
               </a:rPr>
-              <a:t>67-68</a:t>
+              <a:t>65-66</a:t>
             </a:r>
             <a:endParaRPr lang="en-US" sz="2400" dirty="0"/>
           </a:p>

</xml_diff>